<commit_message>
update -- add EMR plots
</commit_message>
<xml_diff>
--- a/experiments/GSE151511/GSE151511_results.pptx
+++ b/experiments/GSE151511/GSE151511_results.pptx
@@ -10,6 +10,7 @@
     <p:sldId id="258" r:id="rId9"/>
     <p:sldId id="259" r:id="rId10"/>
     <p:sldId id="260" r:id="rId11"/>
+    <p:sldId id="261" r:id="rId12"/>
   </p:sldIdLst>
   <p:sldSz cx="14630400" cy="8229600" type="screen4x3"/>
   <p:notesSz cx="6858000" cy="9144000"/>
@@ -3780,7 +3781,7 @@
           </a:p>
           <a:p>
             <a:r>
-              <a:t>Pseudo-bulk exhaustion scores</a:t>
+              <a:t>Pseudo-bulk exhaustion scores (clinical)</a:t>
             </a:r>
           </a:p>
         </p:txBody>
@@ -3908,6 +3909,201 @@
       <p:pic>
         <p:nvPicPr>
           <p:cNvPr id="8" name="Picture 7" descr="GSE151511_query_agg_aggplot_BBD_Tex.jpeg"/>
+          <p:cNvPicPr>
+            <a:picLocks noChangeAspect="1"/>
+          </p:cNvPicPr>
+          <p:nvPr/>
+        </p:nvPicPr>
+        <p:blipFill>
+          <a:blip r:embed="rId7"/>
+          <a:stretch>
+            <a:fillRect/>
+          </a:stretch>
+        </p:blipFill>
+        <p:spPr>
+          <a:xfrm>
+            <a:off x="9601200" y="4114800"/>
+            <a:ext cx="3291840" cy="2743200"/>
+          </a:xfrm>
+          <a:prstGeom prst="rect">
+            <a:avLst/>
+          </a:prstGeom>
+        </p:spPr>
+      </p:pic>
+    </p:spTree>
+  </p:cSld>
+  <p:clrMapOvr>
+    <a:masterClrMapping/>
+  </p:clrMapOvr>
+</p:sld>
+</file>
+
+<file path=ppt/slides/slide6.xml><?xml version="1.0" encoding="utf-8"?>
+<p:sld xmlns:a="http://schemas.openxmlformats.org/drawingml/2006/main" xmlns:p="http://schemas.openxmlformats.org/presentationml/2006/main" xmlns:r="http://schemas.openxmlformats.org/officeDocument/2006/relationships">
+  <p:cSld>
+    <p:spTree>
+      <p:nvGrpSpPr>
+        <p:cNvPr id="1" name=""/>
+        <p:cNvGrpSpPr/>
+        <p:nvPr/>
+      </p:nvGrpSpPr>
+      <p:grpSpPr/>
+      <p:sp>
+        <p:nvSpPr>
+          <p:cNvPr id="2" name="TextBox 1"/>
+          <p:cNvSpPr txBox="1"/>
+          <p:nvPr/>
+        </p:nvSpPr>
+        <p:spPr>
+          <a:xfrm>
+            <a:off x="0" y="0"/>
+            <a:ext cx="914400" cy="914400"/>
+          </a:xfrm>
+          <a:prstGeom prst="rect">
+            <a:avLst/>
+          </a:prstGeom>
+          <a:noFill/>
+        </p:spPr>
+        <p:txBody>
+          <a:bodyPr wrap="none">
+            <a:spAutoFit/>
+          </a:bodyPr>
+          <a:lstStyle/>
+          <a:p>
+            <a:r>
+              <a:t>GSE151511: CD19 CAR T cell infusion product from cancer patients</a:t>
+            </a:r>
+          </a:p>
+          <a:p>
+            <a:r>
+              <a:t>Pseudo-bulk exhaustion scores (EMR)</a:t>
+            </a:r>
+          </a:p>
+        </p:txBody>
+      </p:sp>
+      <p:pic>
+        <p:nvPicPr>
+          <p:cNvPr id="3" name="Picture 2" descr="GSE151511_query_agg_aggplot_CARTEx_630_EMR.jpeg"/>
+          <p:cNvPicPr>
+            <a:picLocks noChangeAspect="1"/>
+          </p:cNvPicPr>
+          <p:nvPr/>
+        </p:nvPicPr>
+        <p:blipFill>
+          <a:blip r:embed="rId2"/>
+          <a:stretch>
+            <a:fillRect/>
+          </a:stretch>
+        </p:blipFill>
+        <p:spPr>
+          <a:xfrm>
+            <a:off x="457200" y="914400"/>
+            <a:ext cx="3291840" cy="2743200"/>
+          </a:xfrm>
+          <a:prstGeom prst="rect">
+            <a:avLst/>
+          </a:prstGeom>
+        </p:spPr>
+      </p:pic>
+      <p:pic>
+        <p:nvPicPr>
+          <p:cNvPr id="4" name="Picture 3" descr="GSE151511_query_agg_aggplot_CARTEx_200_EMR.jpeg"/>
+          <p:cNvPicPr>
+            <a:picLocks noChangeAspect="1"/>
+          </p:cNvPicPr>
+          <p:nvPr/>
+        </p:nvPicPr>
+        <p:blipFill>
+          <a:blip r:embed="rId3"/>
+          <a:stretch>
+            <a:fillRect/>
+          </a:stretch>
+        </p:blipFill>
+        <p:spPr>
+          <a:xfrm>
+            <a:off x="5029200" y="914400"/>
+            <a:ext cx="3291840" cy="2743200"/>
+          </a:xfrm>
+          <a:prstGeom prst="rect">
+            <a:avLst/>
+          </a:prstGeom>
+        </p:spPr>
+      </p:pic>
+      <p:pic>
+        <p:nvPicPr>
+          <p:cNvPr id="5" name="Picture 4" descr="GSE151511_query_agg_aggplot_CARTEx_84_EMR.jpeg"/>
+          <p:cNvPicPr>
+            <a:picLocks noChangeAspect="1"/>
+          </p:cNvPicPr>
+          <p:nvPr/>
+        </p:nvPicPr>
+        <p:blipFill>
+          <a:blip r:embed="rId4"/>
+          <a:stretch>
+            <a:fillRect/>
+          </a:stretch>
+        </p:blipFill>
+        <p:spPr>
+          <a:xfrm>
+            <a:off x="9601200" y="914400"/>
+            <a:ext cx="3291840" cy="2743200"/>
+          </a:xfrm>
+          <a:prstGeom prst="rect">
+            <a:avLst/>
+          </a:prstGeom>
+        </p:spPr>
+      </p:pic>
+      <p:pic>
+        <p:nvPicPr>
+          <p:cNvPr id="6" name="Picture 5" descr="GSE151511_query_agg_aggplot_LCMV_Tex_EMR.jpeg"/>
+          <p:cNvPicPr>
+            <a:picLocks noChangeAspect="1"/>
+          </p:cNvPicPr>
+          <p:nvPr/>
+        </p:nvPicPr>
+        <p:blipFill>
+          <a:blip r:embed="rId5"/>
+          <a:stretch>
+            <a:fillRect/>
+          </a:stretch>
+        </p:blipFill>
+        <p:spPr>
+          <a:xfrm>
+            <a:off x="457200" y="4114800"/>
+            <a:ext cx="3291840" cy="2743200"/>
+          </a:xfrm>
+          <a:prstGeom prst="rect">
+            <a:avLst/>
+          </a:prstGeom>
+        </p:spPr>
+      </p:pic>
+      <p:pic>
+        <p:nvPicPr>
+          <p:cNvPr id="7" name="Picture 6" descr="GSE151511_query_agg_aggplot_NKlike_Tex_EMR.jpeg"/>
+          <p:cNvPicPr>
+            <a:picLocks noChangeAspect="1"/>
+          </p:cNvPicPr>
+          <p:nvPr/>
+        </p:nvPicPr>
+        <p:blipFill>
+          <a:blip r:embed="rId6"/>
+          <a:stretch>
+            <a:fillRect/>
+          </a:stretch>
+        </p:blipFill>
+        <p:spPr>
+          <a:xfrm>
+            <a:off x="5029200" y="4114800"/>
+            <a:ext cx="3291840" cy="2743200"/>
+          </a:xfrm>
+          <a:prstGeom prst="rect">
+            <a:avLst/>
+          </a:prstGeom>
+        </p:spPr>
+      </p:pic>
+      <p:pic>
+        <p:nvPicPr>
+          <p:cNvPr id="8" name="Picture 7" descr="GSE151511_query_agg_aggplot_BBD_Tex_EMR.jpeg"/>
           <p:cNvPicPr>
             <a:picLocks noChangeAspect="1"/>
           </p:cNvPicPr>

</xml_diff>